<commit_message>
changes to day1 and 7 ppts
</commit_message>
<xml_diff>
--- a/day 7 - github/git_github.pptx
+++ b/day 7 - github/git_github.pptx
@@ -5,7 +5,7 @@
     <p:sldMasterId id="2147483648" r:id="rId1"/>
   </p:sldMasterIdLst>
   <p:notesMasterIdLst>
-    <p:notesMasterId r:id="rId55"/>
+    <p:notesMasterId r:id="rId56"/>
   </p:notesMasterIdLst>
   <p:sldIdLst>
     <p:sldId id="305" r:id="rId2"/>
@@ -47,20 +47,21 @@
     <p:sldId id="273" r:id="rId38"/>
     <p:sldId id="274" r:id="rId39"/>
     <p:sldId id="275" r:id="rId40"/>
-    <p:sldId id="284" r:id="rId41"/>
-    <p:sldId id="285" r:id="rId42"/>
-    <p:sldId id="286" r:id="rId43"/>
-    <p:sldId id="287" r:id="rId44"/>
-    <p:sldId id="289" r:id="rId45"/>
-    <p:sldId id="288" r:id="rId46"/>
-    <p:sldId id="276" r:id="rId47"/>
-    <p:sldId id="277" r:id="rId48"/>
-    <p:sldId id="278" r:id="rId49"/>
+    <p:sldId id="309" r:id="rId41"/>
+    <p:sldId id="284" r:id="rId42"/>
+    <p:sldId id="285" r:id="rId43"/>
+    <p:sldId id="286" r:id="rId44"/>
+    <p:sldId id="287" r:id="rId45"/>
+    <p:sldId id="289" r:id="rId46"/>
+    <p:sldId id="288" r:id="rId47"/>
+    <p:sldId id="276" r:id="rId48"/>
+    <p:sldId id="277" r:id="rId49"/>
     <p:sldId id="279" r:id="rId50"/>
-    <p:sldId id="280" r:id="rId51"/>
-    <p:sldId id="281" r:id="rId52"/>
-    <p:sldId id="282" r:id="rId53"/>
-    <p:sldId id="283" r:id="rId54"/>
+    <p:sldId id="278" r:id="rId51"/>
+    <p:sldId id="280" r:id="rId52"/>
+    <p:sldId id="281" r:id="rId53"/>
+    <p:sldId id="282" r:id="rId54"/>
+    <p:sldId id="283" r:id="rId55"/>
   </p:sldIdLst>
   <p:sldSz cx="12192000" cy="6858000"/>
   <p:notesSz cx="12192000" cy="6858000"/>
@@ -260,7 +261,7 @@
           <a:p>
             <a:fld id="{BD20B00D-ACF8-8049-B5AE-5FB398ABD86C}" type="datetimeFigureOut">
               <a:rPr lang="en-US" smtClean="0"/>
-              <a:t>8/1/24</a:t>
+              <a:t>8/7/25</a:t>
             </a:fld>
             <a:endParaRPr lang="en-US"/>
           </a:p>
@@ -700,6 +701,114 @@
   <p:cSld>
     <p:spTree>
       <p:nvGrpSpPr>
+        <p:cNvPr id="1" name="">
+          <a:extLst>
+            <a:ext uri="{FF2B5EF4-FFF2-40B4-BE49-F238E27FC236}">
+              <a16:creationId xmlns:a16="http://schemas.microsoft.com/office/drawing/2014/main" id="{CC2B7F2D-0A9F-D2E7-7D0C-16E80E8AFA49}"/>
+            </a:ext>
+          </a:extLst>
+        </p:cNvPr>
+        <p:cNvGrpSpPr/>
+        <p:nvPr/>
+      </p:nvGrpSpPr>
+      <p:grpSpPr>
+        <a:xfrm>
+          <a:off x="0" y="0"/>
+          <a:ext cx="0" cy="0"/>
+          <a:chOff x="0" y="0"/>
+          <a:chExt cx="0" cy="0"/>
+        </a:xfrm>
+      </p:grpSpPr>
+      <p:sp>
+        <p:nvSpPr>
+          <p:cNvPr id="2" name="Slide Image Placeholder 1">
+            <a:extLst>
+              <a:ext uri="{FF2B5EF4-FFF2-40B4-BE49-F238E27FC236}">
+                <a16:creationId xmlns:a16="http://schemas.microsoft.com/office/drawing/2014/main" id="{4D45ACF8-2BAC-77DC-1002-BA561AAE7CE7}"/>
+              </a:ext>
+            </a:extLst>
+          </p:cNvPr>
+          <p:cNvSpPr>
+            <a:spLocks noGrp="1" noRot="1" noChangeAspect="1"/>
+          </p:cNvSpPr>
+          <p:nvPr>
+            <p:ph type="sldImg"/>
+          </p:nvPr>
+        </p:nvSpPr>
+        <p:spPr/>
+      </p:sp>
+      <p:sp>
+        <p:nvSpPr>
+          <p:cNvPr id="3" name="Notes Placeholder 2">
+            <a:extLst>
+              <a:ext uri="{FF2B5EF4-FFF2-40B4-BE49-F238E27FC236}">
+                <a16:creationId xmlns:a16="http://schemas.microsoft.com/office/drawing/2014/main" id="{100534C8-AC24-C389-7584-354174135146}"/>
+              </a:ext>
+            </a:extLst>
+          </p:cNvPr>
+          <p:cNvSpPr>
+            <a:spLocks noGrp="1"/>
+          </p:cNvSpPr>
+          <p:nvPr>
+            <p:ph type="body" idx="1"/>
+          </p:nvPr>
+        </p:nvSpPr>
+        <p:spPr/>
+        <p:txBody>
+          <a:bodyPr/>
+          <a:lstStyle/>
+          <a:p>
+            <a:endParaRPr lang="en-US" dirty="0"/>
+          </a:p>
+        </p:txBody>
+      </p:sp>
+      <p:sp>
+        <p:nvSpPr>
+          <p:cNvPr id="4" name="Slide Number Placeholder 3">
+            <a:extLst>
+              <a:ext uri="{FF2B5EF4-FFF2-40B4-BE49-F238E27FC236}">
+                <a16:creationId xmlns:a16="http://schemas.microsoft.com/office/drawing/2014/main" id="{4E2849EB-FE7C-BD57-D705-E1A266F6644B}"/>
+              </a:ext>
+            </a:extLst>
+          </p:cNvPr>
+          <p:cNvSpPr>
+            <a:spLocks noGrp="1"/>
+          </p:cNvSpPr>
+          <p:nvPr>
+            <p:ph type="sldNum" sz="quarter" idx="5"/>
+          </p:nvPr>
+        </p:nvSpPr>
+        <p:spPr/>
+        <p:txBody>
+          <a:bodyPr/>
+          <a:lstStyle/>
+          <a:p>
+            <a:fld id="{12927ED0-79B0-5F4F-BADE-670498E4F410}" type="slidenum">
+              <a:rPr lang="en-US" smtClean="0"/>
+              <a:t>40</a:t>
+            </a:fld>
+            <a:endParaRPr lang="en-US"/>
+          </a:p>
+        </p:txBody>
+      </p:sp>
+    </p:spTree>
+    <p:extLst>
+      <p:ext uri="{BB962C8B-B14F-4D97-AF65-F5344CB8AC3E}">
+        <p14:creationId xmlns:p14="http://schemas.microsoft.com/office/powerpoint/2010/main" val="175380062"/>
+      </p:ext>
+    </p:extLst>
+  </p:cSld>
+  <p:clrMapOvr>
+    <a:masterClrMapping/>
+  </p:clrMapOvr>
+</p:notes>
+</file>
+
+<file path=ppt/notesSlides/notesSlide4.xml><?xml version="1.0" encoding="utf-8"?>
+<p:notes xmlns:a="http://schemas.openxmlformats.org/drawingml/2006/main" xmlns:r="http://schemas.openxmlformats.org/officeDocument/2006/relationships" xmlns:p="http://schemas.openxmlformats.org/presentationml/2006/main">
+  <p:cSld>
+    <p:spTree>
+      <p:nvGrpSpPr>
         <p:cNvPr id="1" name=""/>
         <p:cNvGrpSpPr/>
         <p:nvPr/>
@@ -760,7 +869,7 @@
           <a:p>
             <a:fld id="{12927ED0-79B0-5F4F-BADE-670498E4F410}" type="slidenum">
               <a:rPr lang="en-US" smtClean="0"/>
-              <a:t>41</a:t>
+              <a:t>42</a:t>
             </a:fld>
             <a:endParaRPr lang="en-US"/>
           </a:p>
@@ -918,7 +1027,7 @@
           <a:p>
             <a:fld id="{1D8BD707-D9CF-40AE-B4C6-C98DA3205C09}" type="datetimeFigureOut">
               <a:rPr lang="en-US"/>
-              <a:t>8/1/24</a:t>
+              <a:t>8/8/25</a:t>
             </a:fld>
             <a:endParaRPr lang="en-US"/>
           </a:p>
@@ -1093,7 +1202,7 @@
           <a:p>
             <a:fld id="{1D8BD707-D9CF-40AE-B4C6-C98DA3205C09}" type="datetimeFigureOut">
               <a:rPr lang="en-US"/>
-              <a:t>8/1/24</a:t>
+              <a:t>8/7/25</a:t>
             </a:fld>
             <a:endParaRPr lang="en-US"/>
           </a:p>
@@ -1313,7 +1422,7 @@
           <a:p>
             <a:fld id="{1D8BD707-D9CF-40AE-B4C6-C98DA3205C09}" type="datetimeFigureOut">
               <a:rPr lang="en-US"/>
-              <a:t>8/1/24</a:t>
+              <a:t>8/7/25</a:t>
             </a:fld>
             <a:endParaRPr lang="en-US"/>
           </a:p>
@@ -1461,7 +1570,7 @@
           <a:p>
             <a:fld id="{1D8BD707-D9CF-40AE-B4C6-C98DA3205C09}" type="datetimeFigureOut">
               <a:rPr lang="en-US"/>
-              <a:t>8/1/24</a:t>
+              <a:t>8/7/25</a:t>
             </a:fld>
             <a:endParaRPr lang="en-US"/>
           </a:p>
@@ -1667,7 +1776,7 @@
           <a:p>
             <a:fld id="{1D8BD707-D9CF-40AE-B4C6-C98DA3205C09}" type="datetimeFigureOut">
               <a:rPr lang="en-US"/>
-              <a:t>8/1/24</a:t>
+              <a:t>8/7/25</a:t>
             </a:fld>
             <a:endParaRPr lang="en-US"/>
           </a:p>
@@ -1940,7 +2049,7 @@
           <a:p>
             <a:fld id="{1D8BD707-D9CF-40AE-B4C6-C98DA3205C09}" type="datetimeFigureOut">
               <a:rPr lang="en-US"/>
-              <a:t>8/1/24</a:t>
+              <a:t>8/7/25</a:t>
             </a:fld>
             <a:endParaRPr lang="en-US"/>
           </a:p>
@@ -3394,6 +3503,41 @@
           </a:p>
         </p:txBody>
       </p:sp>
+      <p:sp>
+        <p:nvSpPr>
+          <p:cNvPr id="4" name="TextBox 3">
+            <a:extLst>
+              <a:ext uri="{FF2B5EF4-FFF2-40B4-BE49-F238E27FC236}">
+                <a16:creationId xmlns:a16="http://schemas.microsoft.com/office/drawing/2014/main" id="{0DBB0ED1-FABF-C18E-E50F-397B3C724FBB}"/>
+              </a:ext>
+            </a:extLst>
+          </p:cNvPr>
+          <p:cNvSpPr txBox="1"/>
+          <p:nvPr/>
+        </p:nvSpPr>
+        <p:spPr>
+          <a:xfrm>
+            <a:off x="9220200" y="1905000"/>
+            <a:ext cx="1204689" cy="369332"/>
+          </a:xfrm>
+          <a:prstGeom prst="rect">
+            <a:avLst/>
+          </a:prstGeom>
+          <a:noFill/>
+        </p:spPr>
+        <p:txBody>
+          <a:bodyPr wrap="none" rtlCol="0">
+            <a:spAutoFit/>
+          </a:bodyPr>
+          <a:lstStyle/>
+          <a:p>
+            <a:r>
+              <a:rPr lang="en-US" dirty="0"/>
+              <a:t>$ git status</a:t>
+            </a:r>
+          </a:p>
+        </p:txBody>
+      </p:sp>
     </p:spTree>
   </p:cSld>
   <p:clrMapOvr>
@@ -18586,6 +18730,287 @@
   <p:cSld>
     <p:spTree>
       <p:nvGrpSpPr>
+        <p:cNvPr id="1" name="">
+          <a:extLst>
+            <a:ext uri="{FF2B5EF4-FFF2-40B4-BE49-F238E27FC236}">
+              <a16:creationId xmlns:a16="http://schemas.microsoft.com/office/drawing/2014/main" id="{43143050-0EB6-4731-E8E3-77A12854323D}"/>
+            </a:ext>
+          </a:extLst>
+        </p:cNvPr>
+        <p:cNvGrpSpPr/>
+        <p:nvPr/>
+      </p:nvGrpSpPr>
+      <p:grpSpPr>
+        <a:xfrm>
+          <a:off x="0" y="0"/>
+          <a:ext cx="0" cy="0"/>
+          <a:chOff x="0" y="0"/>
+          <a:chExt cx="0" cy="0"/>
+        </a:xfrm>
+      </p:grpSpPr>
+      <p:sp>
+        <p:nvSpPr>
+          <p:cNvPr id="2" name="object 2">
+            <a:extLst>
+              <a:ext uri="{FF2B5EF4-FFF2-40B4-BE49-F238E27FC236}">
+                <a16:creationId xmlns:a16="http://schemas.microsoft.com/office/drawing/2014/main" id="{DDC54E60-17DA-EEFF-1B35-929D8B77492A}"/>
+              </a:ext>
+            </a:extLst>
+          </p:cNvPr>
+          <p:cNvSpPr txBox="1">
+            <a:spLocks noGrp="1"/>
+          </p:cNvSpPr>
+          <p:nvPr>
+            <p:ph type="title"/>
+          </p:nvPr>
+        </p:nvSpPr>
+        <p:spPr>
+          <a:xfrm>
+            <a:off x="916939" y="611124"/>
+            <a:ext cx="4883785" cy="695960"/>
+          </a:xfrm>
+          <a:prstGeom prst="rect">
+            <a:avLst/>
+          </a:prstGeom>
+        </p:spPr>
+        <p:txBody>
+          <a:bodyPr vert="horz" wrap="square" lIns="0" tIns="12700" rIns="0" bIns="0" rtlCol="0">
+            <a:spAutoFit/>
+          </a:bodyPr>
+          <a:lstStyle/>
+          <a:p>
+            <a:pPr marL="12700">
+              <a:lnSpc>
+                <a:spcPct val="100000"/>
+              </a:lnSpc>
+              <a:spcBef>
+                <a:spcPts val="100"/>
+              </a:spcBef>
+            </a:pPr>
+            <a:r>
+              <a:rPr spc="-200" dirty="0"/>
+              <a:t>Connecting </a:t>
+            </a:r>
+            <a:r>
+              <a:rPr spc="-204" dirty="0"/>
+              <a:t>to</a:t>
+            </a:r>
+            <a:r>
+              <a:rPr spc="-475" dirty="0"/>
+              <a:t> </a:t>
+            </a:r>
+            <a:r>
+              <a:rPr spc="-210" dirty="0"/>
+              <a:t>GitHub</a:t>
+            </a:r>
+          </a:p>
+        </p:txBody>
+      </p:sp>
+      <p:sp>
+        <p:nvSpPr>
+          <p:cNvPr id="8" name="TextBox 7">
+            <a:extLst>
+              <a:ext uri="{FF2B5EF4-FFF2-40B4-BE49-F238E27FC236}">
+                <a16:creationId xmlns:a16="http://schemas.microsoft.com/office/drawing/2014/main" id="{A22E7A09-A0EE-F1F3-7DC2-FA0528E8F320}"/>
+              </a:ext>
+            </a:extLst>
+          </p:cNvPr>
+          <p:cNvSpPr txBox="1"/>
+          <p:nvPr/>
+        </p:nvSpPr>
+        <p:spPr>
+          <a:xfrm>
+            <a:off x="685800" y="1690062"/>
+            <a:ext cx="8001000" cy="4708981"/>
+          </a:xfrm>
+          <a:prstGeom prst="rect">
+            <a:avLst/>
+          </a:prstGeom>
+          <a:noFill/>
+        </p:spPr>
+        <p:txBody>
+          <a:bodyPr wrap="square">
+            <a:spAutoFit/>
+          </a:bodyPr>
+          <a:lstStyle/>
+          <a:p>
+            <a:r>
+              <a:rPr lang="en-US" sz="2000" dirty="0"/>
+              <a:t>$ git config --global </a:t>
+            </a:r>
+            <a:r>
+              <a:rPr lang="en-US" sz="2000" dirty="0" err="1"/>
+              <a:t>credential.helper</a:t>
+            </a:r>
+            <a:r>
+              <a:rPr lang="en-US" sz="2000" dirty="0"/>
+              <a:t> 'cache --timeout=3600’</a:t>
+            </a:r>
+          </a:p>
+          <a:p>
+            <a:endParaRPr lang="en-US" sz="2000" dirty="0"/>
+          </a:p>
+          <a:p>
+            <a:r>
+              <a:rPr lang="en-US" sz="2000" dirty="0"/>
+              <a:t>$ git remote add origin https://</a:t>
+            </a:r>
+            <a:r>
+              <a:rPr lang="en-US" sz="2000" dirty="0" err="1"/>
+              <a:t>github.com</a:t>
+            </a:r>
+            <a:r>
+              <a:rPr lang="en-US" sz="2000" dirty="0"/>
+              <a:t>/USERNAME/REPO-</a:t>
+            </a:r>
+            <a:r>
+              <a:rPr lang="en-US" sz="2000" dirty="0" err="1"/>
+              <a:t>NAME.git</a:t>
+            </a:r>
+            <a:endParaRPr lang="en-US" sz="2000" dirty="0"/>
+          </a:p>
+          <a:p>
+            <a:endParaRPr lang="en-US" sz="2000" dirty="0"/>
+          </a:p>
+          <a:p>
+            <a:r>
+              <a:rPr lang="en-US" sz="2000" dirty="0"/>
+              <a:t>$ git branch -M main</a:t>
+            </a:r>
+          </a:p>
+          <a:p>
+            <a:endParaRPr lang="en-US" sz="2000" dirty="0"/>
+          </a:p>
+          <a:p>
+            <a:r>
+              <a:rPr lang="en-US" sz="2000" dirty="0"/>
+              <a:t>$ git push -u origin main</a:t>
+            </a:r>
+          </a:p>
+          <a:p>
+            <a:endParaRPr lang="en-US" sz="2000" dirty="0"/>
+          </a:p>
+          <a:p>
+            <a:r>
+              <a:rPr lang="en-US" sz="2000" dirty="0" err="1"/>
+              <a:t>Whats</a:t>
+            </a:r>
+            <a:r>
+              <a:rPr lang="en-US" sz="2000" dirty="0"/>
+              <a:t> happening?</a:t>
+            </a:r>
+          </a:p>
+          <a:p>
+            <a:pPr marL="342900" indent="-342900">
+              <a:buFont typeface="Arial" panose="020B0604020202020204" pitchFamily="34" charset="0"/>
+              <a:buChar char="•"/>
+            </a:pPr>
+            <a:r>
+              <a:rPr lang="en-US" sz="2000" dirty="0"/>
+              <a:t>First push → GitHub will ask for your username and password (or personal access token if you have 2FA enabled).</a:t>
+            </a:r>
+          </a:p>
+          <a:p>
+            <a:pPr marL="342900" indent="-342900">
+              <a:buFont typeface="Arial" panose="020B0604020202020204" pitchFamily="34" charset="0"/>
+              <a:buChar char="•"/>
+            </a:pPr>
+            <a:endParaRPr lang="en-US" sz="2000" dirty="0"/>
+          </a:p>
+          <a:p>
+            <a:pPr marL="342900" indent="-342900">
+              <a:buFont typeface="Arial" panose="020B0604020202020204" pitchFamily="34" charset="0"/>
+              <a:buChar char="•"/>
+            </a:pPr>
+            <a:r>
+              <a:rPr lang="en-US" sz="2000" dirty="0"/>
+              <a:t>Git caches it → No more prompts for the next hour.</a:t>
+            </a:r>
+          </a:p>
+          <a:p>
+            <a:pPr marL="342900" indent="-342900">
+              <a:buFont typeface="Arial" panose="020B0604020202020204" pitchFamily="34" charset="0"/>
+              <a:buChar char="•"/>
+            </a:pPr>
+            <a:endParaRPr lang="en-US" sz="2000" dirty="0"/>
+          </a:p>
+          <a:p>
+            <a:pPr marL="342900" indent="-342900">
+              <a:buFont typeface="Arial" panose="020B0604020202020204" pitchFamily="34" charset="0"/>
+              <a:buChar char="•"/>
+            </a:pPr>
+            <a:r>
+              <a:rPr lang="en-US" sz="2000" dirty="0"/>
+              <a:t>After the timeout → You just log in again once.</a:t>
+            </a:r>
+          </a:p>
+        </p:txBody>
+      </p:sp>
+      <p:pic>
+        <p:nvPicPr>
+          <p:cNvPr id="1026" name="Picture 2" descr="GitHub Logomark">
+            <a:extLst>
+              <a:ext uri="{FF2B5EF4-FFF2-40B4-BE49-F238E27FC236}">
+                <a16:creationId xmlns:a16="http://schemas.microsoft.com/office/drawing/2014/main" id="{2032F0B2-5A0D-9D27-AFB3-5570805A8D92}"/>
+              </a:ext>
+            </a:extLst>
+          </p:cNvPr>
+          <p:cNvPicPr>
+            <a:picLocks noChangeAspect="1" noChangeArrowheads="1"/>
+          </p:cNvPicPr>
+          <p:nvPr/>
+        </p:nvPicPr>
+        <p:blipFill>
+          <a:blip r:embed="rId3">
+            <a:extLst>
+              <a:ext uri="{28A0092B-C50C-407E-A947-70E740481C1C}">
+                <a14:useLocalDpi xmlns:a14="http://schemas.microsoft.com/office/drawing/2010/main" val="0"/>
+              </a:ext>
+            </a:extLst>
+          </a:blip>
+          <a:srcRect/>
+          <a:stretch>
+            <a:fillRect/>
+          </a:stretch>
+        </p:blipFill>
+        <p:spPr bwMode="auto">
+          <a:xfrm>
+            <a:off x="8686800" y="2209800"/>
+            <a:ext cx="3124200" cy="3124200"/>
+          </a:xfrm>
+          <a:prstGeom prst="rect">
+            <a:avLst/>
+          </a:prstGeom>
+          <a:noFill/>
+          <a:extLst>
+            <a:ext uri="{909E8E84-426E-40DD-AFC4-6F175D3DCCD1}">
+              <a14:hiddenFill xmlns:a14="http://schemas.microsoft.com/office/drawing/2010/main">
+                <a:solidFill>
+                  <a:srgbClr val="FFFFFF"/>
+                </a:solidFill>
+              </a14:hiddenFill>
+            </a:ext>
+          </a:extLst>
+        </p:spPr>
+      </p:pic>
+    </p:spTree>
+    <p:extLst>
+      <p:ext uri="{BB962C8B-B14F-4D97-AF65-F5344CB8AC3E}">
+        <p14:creationId xmlns:p14="http://schemas.microsoft.com/office/powerpoint/2010/main" val="488521299"/>
+      </p:ext>
+    </p:extLst>
+  </p:cSld>
+  <p:clrMapOvr>
+    <a:masterClrMapping/>
+  </p:clrMapOvr>
+</p:sld>
+</file>
+
+<file path=ppt/slides/slide41.xml><?xml version="1.0" encoding="utf-8"?>
+<p:sld xmlns:a="http://schemas.openxmlformats.org/drawingml/2006/main" xmlns:r="http://schemas.openxmlformats.org/officeDocument/2006/relationships" xmlns:p="http://schemas.openxmlformats.org/presentationml/2006/main">
+  <p:cSld>
+    <p:spTree>
+      <p:nvGrpSpPr>
         <p:cNvPr id="1" name=""/>
         <p:cNvGrpSpPr/>
         <p:nvPr/>
@@ -18659,7 +19084,7 @@
         <p:spPr>
           <a:xfrm>
             <a:off x="304801" y="1716532"/>
-            <a:ext cx="10004424" cy="4411464"/>
+            <a:ext cx="10004424" cy="4811574"/>
           </a:xfrm>
           <a:prstGeom prst="rect">
             <a:avLst/>
@@ -18817,35 +19242,39 @@
             </a:r>
           </a:p>
           <a:p>
-            <a:pPr marL="241300" indent="-228600">
+            <a:pPr marL="12700">
               <a:lnSpc>
                 <a:spcPct val="100000"/>
               </a:lnSpc>
               <a:spcBef>
                 <a:spcPts val="720"/>
               </a:spcBef>
-              <a:buFont typeface="Arial"/>
-              <a:buChar char="•"/>
               <a:tabLst>
                 <a:tab pos="241300" algn="l"/>
                 <a:tab pos="2974340" algn="l"/>
               </a:tabLst>
             </a:pPr>
+            <a:r>
+              <a:rPr lang="en-US" sz="2600" dirty="0">
+                <a:latin typeface="Trebuchet MS"/>
+                <a:cs typeface="Trebuchet MS"/>
+                <a:hlinkClick r:id="rId3"/>
+              </a:rPr>
+              <a:t>https://docs.github.com/en/authentication/keeping-your-account-and-data-secure/managing-your-personal-access-tokens</a:t>
+            </a:r>
             <a:endParaRPr lang="en-US" sz="2600" dirty="0">
               <a:latin typeface="Trebuchet MS"/>
               <a:cs typeface="Trebuchet MS"/>
             </a:endParaRPr>
           </a:p>
           <a:p>
-            <a:pPr marL="241300" indent="-228600">
+            <a:pPr marL="12700">
               <a:lnSpc>
                 <a:spcPct val="100000"/>
               </a:lnSpc>
               <a:spcBef>
                 <a:spcPts val="720"/>
               </a:spcBef>
-              <a:buFont typeface="Arial"/>
-              <a:buChar char="•"/>
               <a:tabLst>
                 <a:tab pos="241300" algn="l"/>
                 <a:tab pos="2974340" algn="l"/>
@@ -18921,7 +19350,7 @@
 </p:sld>
 </file>
 
-<file path=ppt/slides/slide41.xml><?xml version="1.0" encoding="utf-8"?>
+<file path=ppt/slides/slide42.xml><?xml version="1.0" encoding="utf-8"?>
 <p:sld xmlns:a="http://schemas.openxmlformats.org/drawingml/2006/main" xmlns:r="http://schemas.openxmlformats.org/officeDocument/2006/relationships" xmlns:p="http://schemas.openxmlformats.org/presentationml/2006/main">
   <p:cSld>
     <p:spTree>
@@ -19247,7 +19676,7 @@
 </p:sld>
 </file>
 
-<file path=ppt/slides/slide42.xml><?xml version="1.0" encoding="utf-8"?>
+<file path=ppt/slides/slide43.xml><?xml version="1.0" encoding="utf-8"?>
 <p:sld xmlns:a="http://schemas.openxmlformats.org/drawingml/2006/main" xmlns:r="http://schemas.openxmlformats.org/officeDocument/2006/relationships" xmlns:p="http://schemas.openxmlformats.org/presentationml/2006/main">
   <p:cSld>
     <p:spTree>
@@ -19501,7 +19930,7 @@
 </p:sld>
 </file>
 
-<file path=ppt/slides/slide43.xml><?xml version="1.0" encoding="utf-8"?>
+<file path=ppt/slides/slide44.xml><?xml version="1.0" encoding="utf-8"?>
 <p:sld xmlns:a="http://schemas.openxmlformats.org/drawingml/2006/main" xmlns:r="http://schemas.openxmlformats.org/officeDocument/2006/relationships" xmlns:p="http://schemas.openxmlformats.org/presentationml/2006/main">
   <p:cSld>
     <p:spTree>
@@ -19819,7 +20248,7 @@
 </p:sld>
 </file>
 
-<file path=ppt/slides/slide44.xml><?xml version="1.0" encoding="utf-8"?>
+<file path=ppt/slides/slide45.xml><?xml version="1.0" encoding="utf-8"?>
 <p:sld xmlns:a="http://schemas.openxmlformats.org/drawingml/2006/main" xmlns:r="http://schemas.openxmlformats.org/officeDocument/2006/relationships" xmlns:p="http://schemas.openxmlformats.org/presentationml/2006/main">
   <p:cSld>
     <p:spTree>
@@ -20039,7 +20468,7 @@
 </p:sld>
 </file>
 
-<file path=ppt/slides/slide45.xml><?xml version="1.0" encoding="utf-8"?>
+<file path=ppt/slides/slide46.xml><?xml version="1.0" encoding="utf-8"?>
 <p:sld xmlns:a="http://schemas.openxmlformats.org/drawingml/2006/main" xmlns:r="http://schemas.openxmlformats.org/officeDocument/2006/relationships" xmlns:p="http://schemas.openxmlformats.org/presentationml/2006/main">
   <p:cSld>
     <p:spTree>
@@ -20240,7 +20669,7 @@
 </p:sld>
 </file>
 
-<file path=ppt/slides/slide46.xml><?xml version="1.0" encoding="utf-8"?>
+<file path=ppt/slides/slide47.xml><?xml version="1.0" encoding="utf-8"?>
 <p:sld xmlns:a="http://schemas.openxmlformats.org/drawingml/2006/main" xmlns:r="http://schemas.openxmlformats.org/officeDocument/2006/relationships" xmlns:p="http://schemas.openxmlformats.org/presentationml/2006/main">
   <p:cSld>
     <p:spTree>
@@ -21212,7 +21641,7 @@
 </p:sld>
 </file>
 
-<file path=ppt/slides/slide47.xml><?xml version="1.0" encoding="utf-8"?>
+<file path=ppt/slides/slide48.xml><?xml version="1.0" encoding="utf-8"?>
 <p:sld xmlns:a="http://schemas.openxmlformats.org/drawingml/2006/main" xmlns:r="http://schemas.openxmlformats.org/officeDocument/2006/relationships" xmlns:p="http://schemas.openxmlformats.org/presentationml/2006/main">
   <p:cSld>
     <p:spTree>
@@ -21307,404 +21736,6 @@
           <a:lstStyle/>
           <a:p>
             <a:endParaRPr/>
-          </a:p>
-        </p:txBody>
-      </p:sp>
-    </p:spTree>
-  </p:cSld>
-  <p:clrMapOvr>
-    <a:masterClrMapping/>
-  </p:clrMapOvr>
-</p:sld>
-</file>
-
-<file path=ppt/slides/slide48.xml><?xml version="1.0" encoding="utf-8"?>
-<p:sld xmlns:a="http://schemas.openxmlformats.org/drawingml/2006/main" xmlns:r="http://schemas.openxmlformats.org/officeDocument/2006/relationships" xmlns:p="http://schemas.openxmlformats.org/presentationml/2006/main">
-  <p:cSld>
-    <p:spTree>
-      <p:nvGrpSpPr>
-        <p:cNvPr id="1" name=""/>
-        <p:cNvGrpSpPr/>
-        <p:nvPr/>
-      </p:nvGrpSpPr>
-      <p:grpSpPr>
-        <a:xfrm>
-          <a:off x="0" y="0"/>
-          <a:ext cx="0" cy="0"/>
-          <a:chOff x="0" y="0"/>
-          <a:chExt cx="0" cy="0"/>
-        </a:xfrm>
-      </p:grpSpPr>
-      <p:sp>
-        <p:nvSpPr>
-          <p:cNvPr id="2" name="object 2"/>
-          <p:cNvSpPr txBox="1">
-            <a:spLocks noGrp="1"/>
-          </p:cNvSpPr>
-          <p:nvPr>
-            <p:ph type="title"/>
-          </p:nvPr>
-        </p:nvSpPr>
-        <p:spPr>
-          <a:xfrm>
-            <a:off x="916939" y="611124"/>
-            <a:ext cx="1707514" cy="695960"/>
-          </a:xfrm>
-          <a:prstGeom prst="rect">
-            <a:avLst/>
-          </a:prstGeom>
-        </p:spPr>
-        <p:txBody>
-          <a:bodyPr vert="horz" wrap="square" lIns="0" tIns="12700" rIns="0" bIns="0" rtlCol="0">
-            <a:spAutoFit/>
-          </a:bodyPr>
-          <a:lstStyle/>
-          <a:p>
-            <a:pPr marL="12700">
-              <a:lnSpc>
-                <a:spcPct val="100000"/>
-              </a:lnSpc>
-              <a:spcBef>
-                <a:spcPts val="100"/>
-              </a:spcBef>
-            </a:pPr>
-            <a:r>
-              <a:rPr spc="-195" dirty="0"/>
-              <a:t>Cloning</a:t>
-            </a:r>
-          </a:p>
-        </p:txBody>
-      </p:sp>
-      <p:sp>
-        <p:nvSpPr>
-          <p:cNvPr id="3" name="object 3"/>
-          <p:cNvSpPr txBox="1"/>
-          <p:nvPr/>
-        </p:nvSpPr>
-        <p:spPr>
-          <a:xfrm>
-            <a:off x="916939" y="1795778"/>
-            <a:ext cx="9537065" cy="1339215"/>
-          </a:xfrm>
-          <a:prstGeom prst="rect">
-            <a:avLst/>
-          </a:prstGeom>
-        </p:spPr>
-        <p:txBody>
-          <a:bodyPr vert="horz" wrap="square" lIns="0" tIns="63500" rIns="0" bIns="0" rtlCol="0">
-            <a:spAutoFit/>
-          </a:bodyPr>
-          <a:lstStyle/>
-          <a:p>
-            <a:pPr marL="241300" marR="5080" indent="-228600">
-              <a:lnSpc>
-                <a:spcPts val="3000"/>
-              </a:lnSpc>
-              <a:spcBef>
-                <a:spcPts val="500"/>
-              </a:spcBef>
-              <a:buFont typeface="Arial"/>
-              <a:buChar char="•"/>
-              <a:tabLst>
-                <a:tab pos="241300" algn="l"/>
-              </a:tabLst>
-            </a:pPr>
-            <a:r>
-              <a:rPr sz="2800" spc="-170" dirty="0">
-                <a:latin typeface="Trebuchet MS"/>
-                <a:cs typeface="Trebuchet MS"/>
-              </a:rPr>
-              <a:t>Create</a:t>
-            </a:r>
-            <a:r>
-              <a:rPr sz="2800" spc="-220" dirty="0">
-                <a:latin typeface="Trebuchet MS"/>
-                <a:cs typeface="Trebuchet MS"/>
-              </a:rPr>
-              <a:t> </a:t>
-            </a:r>
-            <a:r>
-              <a:rPr sz="2800" spc="-130" dirty="0">
-                <a:latin typeface="Trebuchet MS"/>
-                <a:cs typeface="Trebuchet MS"/>
-              </a:rPr>
-              <a:t>a</a:t>
-            </a:r>
-            <a:r>
-              <a:rPr sz="2800" spc="-210" dirty="0">
-                <a:latin typeface="Trebuchet MS"/>
-                <a:cs typeface="Trebuchet MS"/>
-              </a:rPr>
-              <a:t> </a:t>
-            </a:r>
-            <a:r>
-              <a:rPr sz="2800" spc="-155" dirty="0">
-                <a:latin typeface="Trebuchet MS"/>
-                <a:cs typeface="Trebuchet MS"/>
-              </a:rPr>
-              <a:t>local</a:t>
-            </a:r>
-            <a:r>
-              <a:rPr sz="2800" spc="-210" dirty="0">
-                <a:latin typeface="Trebuchet MS"/>
-                <a:cs typeface="Trebuchet MS"/>
-              </a:rPr>
-              <a:t> </a:t>
-            </a:r>
-            <a:r>
-              <a:rPr sz="2800" spc="-120" dirty="0">
-                <a:latin typeface="Trebuchet MS"/>
-                <a:cs typeface="Trebuchet MS"/>
-              </a:rPr>
-              <a:t>copy</a:t>
-            </a:r>
-            <a:r>
-              <a:rPr sz="2800" spc="-210" dirty="0">
-                <a:latin typeface="Trebuchet MS"/>
-                <a:cs typeface="Trebuchet MS"/>
-              </a:rPr>
-              <a:t> </a:t>
-            </a:r>
-            <a:r>
-              <a:rPr sz="2800" spc="-45" dirty="0">
-                <a:latin typeface="Trebuchet MS"/>
-                <a:cs typeface="Trebuchet MS"/>
-              </a:rPr>
-              <a:t>on</a:t>
-            </a:r>
-            <a:r>
-              <a:rPr sz="2800" spc="-200" dirty="0">
-                <a:latin typeface="Trebuchet MS"/>
-                <a:cs typeface="Trebuchet MS"/>
-              </a:rPr>
-              <a:t> </a:t>
-            </a:r>
-            <a:r>
-              <a:rPr sz="2800" spc="-90" dirty="0">
-                <a:latin typeface="Trebuchet MS"/>
-                <a:cs typeface="Trebuchet MS"/>
-              </a:rPr>
-              <a:t>your</a:t>
-            </a:r>
-            <a:r>
-              <a:rPr sz="2800" spc="-210" dirty="0">
-                <a:latin typeface="Trebuchet MS"/>
-                <a:cs typeface="Trebuchet MS"/>
-              </a:rPr>
-              <a:t> </a:t>
-            </a:r>
-            <a:r>
-              <a:rPr sz="2800" spc="-120" dirty="0">
-                <a:latin typeface="Trebuchet MS"/>
-                <a:cs typeface="Trebuchet MS"/>
-              </a:rPr>
-              <a:t>computer</a:t>
-            </a:r>
-            <a:r>
-              <a:rPr sz="2800" spc="-210" dirty="0">
-                <a:latin typeface="Trebuchet MS"/>
-                <a:cs typeface="Trebuchet MS"/>
-              </a:rPr>
-              <a:t> </a:t>
-            </a:r>
-            <a:r>
-              <a:rPr sz="2800" spc="-95" dirty="0">
-                <a:latin typeface="Trebuchet MS"/>
-                <a:cs typeface="Trebuchet MS"/>
-              </a:rPr>
-              <a:t>and</a:t>
-            </a:r>
-            <a:r>
-              <a:rPr sz="2800" spc="-200" dirty="0">
-                <a:latin typeface="Trebuchet MS"/>
-                <a:cs typeface="Trebuchet MS"/>
-              </a:rPr>
-              <a:t> </a:t>
-            </a:r>
-            <a:r>
-              <a:rPr sz="2800" spc="-114" dirty="0">
-                <a:latin typeface="Trebuchet MS"/>
-                <a:cs typeface="Trebuchet MS"/>
-              </a:rPr>
-              <a:t>sync</a:t>
-            </a:r>
-            <a:r>
-              <a:rPr sz="2800" spc="-204" dirty="0">
-                <a:latin typeface="Trebuchet MS"/>
-                <a:cs typeface="Trebuchet MS"/>
-              </a:rPr>
-              <a:t> </a:t>
-            </a:r>
-            <a:r>
-              <a:rPr sz="2800" spc="-125" dirty="0">
-                <a:latin typeface="Trebuchet MS"/>
-                <a:cs typeface="Trebuchet MS"/>
-              </a:rPr>
-              <a:t>between</a:t>
-            </a:r>
-            <a:r>
-              <a:rPr sz="2800" spc="-200" dirty="0">
-                <a:latin typeface="Trebuchet MS"/>
-                <a:cs typeface="Trebuchet MS"/>
-              </a:rPr>
-              <a:t> </a:t>
-            </a:r>
-            <a:r>
-              <a:rPr sz="2800" spc="-120" dirty="0">
-                <a:latin typeface="Trebuchet MS"/>
-                <a:cs typeface="Trebuchet MS"/>
-              </a:rPr>
-              <a:t>the</a:t>
-            </a:r>
-            <a:r>
-              <a:rPr sz="2800" spc="-215" dirty="0">
-                <a:latin typeface="Trebuchet MS"/>
-                <a:cs typeface="Trebuchet MS"/>
-              </a:rPr>
-              <a:t> </a:t>
-            </a:r>
-            <a:r>
-              <a:rPr sz="2800" spc="-105" dirty="0">
-                <a:latin typeface="Trebuchet MS"/>
-                <a:cs typeface="Trebuchet MS"/>
-              </a:rPr>
-              <a:t>two  </a:t>
-            </a:r>
-            <a:r>
-              <a:rPr sz="2800" spc="-120" dirty="0">
-                <a:latin typeface="Trebuchet MS"/>
-                <a:cs typeface="Trebuchet MS"/>
-              </a:rPr>
-              <a:t>locations</a:t>
-            </a:r>
-            <a:endParaRPr sz="2800">
-              <a:latin typeface="Trebuchet MS"/>
-              <a:cs typeface="Trebuchet MS"/>
-            </a:endParaRPr>
-          </a:p>
-          <a:p>
-            <a:pPr marL="241300" indent="-228600">
-              <a:lnSpc>
-                <a:spcPct val="100000"/>
-              </a:lnSpc>
-              <a:spcBef>
-                <a:spcPts val="585"/>
-              </a:spcBef>
-              <a:buFont typeface="Arial"/>
-              <a:buChar char="•"/>
-              <a:tabLst>
-                <a:tab pos="241300" algn="l"/>
-              </a:tabLst>
-            </a:pPr>
-            <a:r>
-              <a:rPr sz="2800" spc="-90" dirty="0">
-                <a:latin typeface="Trebuchet MS"/>
-                <a:cs typeface="Trebuchet MS"/>
-              </a:rPr>
-              <a:t>Need</a:t>
-            </a:r>
-            <a:r>
-              <a:rPr sz="2800" spc="-210" dirty="0">
-                <a:latin typeface="Trebuchet MS"/>
-                <a:cs typeface="Trebuchet MS"/>
-              </a:rPr>
-              <a:t> </a:t>
-            </a:r>
-            <a:r>
-              <a:rPr sz="2800" spc="-95" dirty="0">
-                <a:latin typeface="Trebuchet MS"/>
-                <a:cs typeface="Trebuchet MS"/>
-              </a:rPr>
-              <a:t>permission</a:t>
-            </a:r>
-            <a:r>
-              <a:rPr sz="2800" spc="-204" dirty="0">
-                <a:latin typeface="Trebuchet MS"/>
-                <a:cs typeface="Trebuchet MS"/>
-              </a:rPr>
-              <a:t> </a:t>
-            </a:r>
-            <a:r>
-              <a:rPr sz="2800" spc="-110" dirty="0">
-                <a:latin typeface="Trebuchet MS"/>
-                <a:cs typeface="Trebuchet MS"/>
-              </a:rPr>
-              <a:t>of</a:t>
-            </a:r>
-            <a:r>
-              <a:rPr sz="2800" spc="-210" dirty="0">
-                <a:latin typeface="Trebuchet MS"/>
-                <a:cs typeface="Trebuchet MS"/>
-              </a:rPr>
-              <a:t> </a:t>
-            </a:r>
-            <a:r>
-              <a:rPr sz="2800" spc="-125" dirty="0">
-                <a:latin typeface="Trebuchet MS"/>
-                <a:cs typeface="Trebuchet MS"/>
-              </a:rPr>
-              <a:t>the</a:t>
-            </a:r>
-            <a:r>
-              <a:rPr sz="2800" spc="-215" dirty="0">
-                <a:latin typeface="Trebuchet MS"/>
-                <a:cs typeface="Trebuchet MS"/>
-              </a:rPr>
-              <a:t> </a:t>
-            </a:r>
-            <a:r>
-              <a:rPr sz="2800" spc="-90" dirty="0">
-                <a:latin typeface="Trebuchet MS"/>
-                <a:cs typeface="Trebuchet MS"/>
-              </a:rPr>
-              <a:t>owner</a:t>
-            </a:r>
-            <a:r>
-              <a:rPr sz="2800" spc="-210" dirty="0">
-                <a:latin typeface="Trebuchet MS"/>
-                <a:cs typeface="Trebuchet MS"/>
-              </a:rPr>
-              <a:t> </a:t>
-            </a:r>
-            <a:r>
-              <a:rPr sz="2800" spc="-114" dirty="0">
-                <a:latin typeface="Trebuchet MS"/>
-                <a:cs typeface="Trebuchet MS"/>
-              </a:rPr>
-              <a:t>to</a:t>
-            </a:r>
-            <a:r>
-              <a:rPr sz="2800" spc="-204" dirty="0">
-                <a:latin typeface="Trebuchet MS"/>
-                <a:cs typeface="Trebuchet MS"/>
-              </a:rPr>
-              <a:t> </a:t>
-            </a:r>
-            <a:r>
-              <a:rPr sz="2800" spc="-65" dirty="0">
-                <a:latin typeface="Trebuchet MS"/>
-                <a:cs typeface="Trebuchet MS"/>
-              </a:rPr>
-              <a:t>push</a:t>
-            </a:r>
-            <a:r>
-              <a:rPr sz="2800" spc="-204" dirty="0">
-                <a:latin typeface="Trebuchet MS"/>
-                <a:cs typeface="Trebuchet MS"/>
-              </a:rPr>
-              <a:t> </a:t>
-            </a:r>
-            <a:r>
-              <a:rPr sz="2800" spc="-110" dirty="0">
-                <a:latin typeface="Trebuchet MS"/>
-                <a:cs typeface="Trebuchet MS"/>
-              </a:rPr>
-              <a:t>changes</a:t>
-            </a:r>
-            <a:endParaRPr sz="2800">
-              <a:latin typeface="Trebuchet MS"/>
-              <a:cs typeface="Trebuchet MS"/>
-            </a:endParaRPr>
           </a:p>
         </p:txBody>
       </p:sp>
@@ -21926,7 +21957,7 @@
               </a:rPr>
               <a:t>on</a:t>
             </a:r>
-            <a:endParaRPr sz="2800">
+            <a:endParaRPr sz="2800" dirty="0">
               <a:latin typeface="Trebuchet MS"/>
               <a:cs typeface="Trebuchet MS"/>
             </a:endParaRPr>
@@ -22127,10 +22158,45 @@
               </a:rPr>
               <a:t>Repo</a:t>
             </a:r>
-            <a:endParaRPr sz="2800">
+            <a:endParaRPr sz="2800" dirty="0">
               <a:latin typeface="Trebuchet MS"/>
               <a:cs typeface="Trebuchet MS"/>
             </a:endParaRPr>
+          </a:p>
+        </p:txBody>
+      </p:sp>
+      <p:sp>
+        <p:nvSpPr>
+          <p:cNvPr id="4" name="TextBox 3">
+            <a:extLst>
+              <a:ext uri="{FF2B5EF4-FFF2-40B4-BE49-F238E27FC236}">
+                <a16:creationId xmlns:a16="http://schemas.microsoft.com/office/drawing/2014/main" id="{FDEF1C54-C1C0-7BA9-8863-25CB0A21F48A}"/>
+              </a:ext>
+            </a:extLst>
+          </p:cNvPr>
+          <p:cNvSpPr txBox="1"/>
+          <p:nvPr/>
+        </p:nvSpPr>
+        <p:spPr>
+          <a:xfrm>
+            <a:off x="837282" y="4065224"/>
+            <a:ext cx="3315716" cy="369332"/>
+          </a:xfrm>
+          <a:prstGeom prst="rect">
+            <a:avLst/>
+          </a:prstGeom>
+          <a:noFill/>
+        </p:spPr>
+        <p:txBody>
+          <a:bodyPr wrap="none" rtlCol="0">
+            <a:spAutoFit/>
+          </a:bodyPr>
+          <a:lstStyle/>
+          <a:p>
+            <a:r>
+              <a:rPr lang="en-US" dirty="0"/>
+              <a:t>Practice: Fork the bootcamp repo</a:t>
+            </a:r>
           </a:p>
         </p:txBody>
       </p:sp>
@@ -22468,7 +22534,7 @@
         <p:spPr>
           <a:xfrm>
             <a:off x="916939" y="611124"/>
-            <a:ext cx="3000375" cy="695960"/>
+            <a:ext cx="1707514" cy="695960"/>
           </a:xfrm>
           <a:prstGeom prst="rect">
             <a:avLst/>
@@ -22489,20 +22555,8 @@
               </a:spcBef>
             </a:pPr>
             <a:r>
-              <a:rPr spc="-225" dirty="0"/>
-              <a:t>Fork </a:t>
-            </a:r>
-            <a:r>
-              <a:rPr spc="-160" dirty="0"/>
-              <a:t>vs</a:t>
-            </a:r>
-            <a:r>
-              <a:rPr spc="-509" dirty="0"/>
-              <a:t> </a:t>
-            </a:r>
-            <a:r>
-              <a:rPr spc="-204" dirty="0"/>
-              <a:t>Clone</a:t>
+              <a:rPr spc="-195" dirty="0"/>
+              <a:t>Cloning</a:t>
             </a:r>
           </a:p>
         </p:txBody>
@@ -22510,29 +22564,490 @@
       <p:sp>
         <p:nvSpPr>
           <p:cNvPr id="3" name="object 3"/>
-          <p:cNvSpPr/>
+          <p:cNvSpPr txBox="1"/>
           <p:nvPr/>
         </p:nvSpPr>
         <p:spPr>
           <a:xfrm>
-            <a:off x="4125429" y="365127"/>
-            <a:ext cx="5800801" cy="6285953"/>
+            <a:off x="916939" y="1795778"/>
+            <a:ext cx="9537065" cy="1339215"/>
           </a:xfrm>
           <a:prstGeom prst="rect">
             <a:avLst/>
           </a:prstGeom>
-          <a:blipFill>
-            <a:blip r:embed="rId2" cstate="print"/>
-            <a:stretch>
-              <a:fillRect/>
-            </a:stretch>
-          </a:blipFill>
         </p:spPr>
         <p:txBody>
-          <a:bodyPr wrap="square" lIns="0" tIns="0" rIns="0" bIns="0" rtlCol="0"/>
+          <a:bodyPr vert="horz" wrap="square" lIns="0" tIns="63500" rIns="0" bIns="0" rtlCol="0">
+            <a:spAutoFit/>
+          </a:bodyPr>
           <a:lstStyle/>
           <a:p>
-            <a:endParaRPr/>
+            <a:pPr marL="241300" marR="5080" indent="-228600">
+              <a:lnSpc>
+                <a:spcPts val="3000"/>
+              </a:lnSpc>
+              <a:spcBef>
+                <a:spcPts val="500"/>
+              </a:spcBef>
+              <a:buFont typeface="Arial"/>
+              <a:buChar char="•"/>
+              <a:tabLst>
+                <a:tab pos="241300" algn="l"/>
+              </a:tabLst>
+            </a:pPr>
+            <a:r>
+              <a:rPr sz="2800" spc="-170" dirty="0">
+                <a:latin typeface="Trebuchet MS"/>
+                <a:cs typeface="Trebuchet MS"/>
+              </a:rPr>
+              <a:t>Create</a:t>
+            </a:r>
+            <a:r>
+              <a:rPr sz="2800" spc="-220" dirty="0">
+                <a:latin typeface="Trebuchet MS"/>
+                <a:cs typeface="Trebuchet MS"/>
+              </a:rPr>
+              <a:t> </a:t>
+            </a:r>
+            <a:r>
+              <a:rPr sz="2800" spc="-130" dirty="0">
+                <a:latin typeface="Trebuchet MS"/>
+                <a:cs typeface="Trebuchet MS"/>
+              </a:rPr>
+              <a:t>a</a:t>
+            </a:r>
+            <a:r>
+              <a:rPr sz="2800" spc="-210" dirty="0">
+                <a:latin typeface="Trebuchet MS"/>
+                <a:cs typeface="Trebuchet MS"/>
+              </a:rPr>
+              <a:t> </a:t>
+            </a:r>
+            <a:r>
+              <a:rPr sz="2800" spc="-155" dirty="0">
+                <a:latin typeface="Trebuchet MS"/>
+                <a:cs typeface="Trebuchet MS"/>
+              </a:rPr>
+              <a:t>local</a:t>
+            </a:r>
+            <a:r>
+              <a:rPr sz="2800" spc="-210" dirty="0">
+                <a:latin typeface="Trebuchet MS"/>
+                <a:cs typeface="Trebuchet MS"/>
+              </a:rPr>
+              <a:t> </a:t>
+            </a:r>
+            <a:r>
+              <a:rPr sz="2800" spc="-120" dirty="0">
+                <a:latin typeface="Trebuchet MS"/>
+                <a:cs typeface="Trebuchet MS"/>
+              </a:rPr>
+              <a:t>copy</a:t>
+            </a:r>
+            <a:r>
+              <a:rPr sz="2800" spc="-210" dirty="0">
+                <a:latin typeface="Trebuchet MS"/>
+                <a:cs typeface="Trebuchet MS"/>
+              </a:rPr>
+              <a:t> </a:t>
+            </a:r>
+            <a:r>
+              <a:rPr sz="2800" spc="-45" dirty="0">
+                <a:latin typeface="Trebuchet MS"/>
+                <a:cs typeface="Trebuchet MS"/>
+              </a:rPr>
+              <a:t>on</a:t>
+            </a:r>
+            <a:r>
+              <a:rPr sz="2800" spc="-200" dirty="0">
+                <a:latin typeface="Trebuchet MS"/>
+                <a:cs typeface="Trebuchet MS"/>
+              </a:rPr>
+              <a:t> </a:t>
+            </a:r>
+            <a:r>
+              <a:rPr sz="2800" spc="-90" dirty="0">
+                <a:latin typeface="Trebuchet MS"/>
+                <a:cs typeface="Trebuchet MS"/>
+              </a:rPr>
+              <a:t>your</a:t>
+            </a:r>
+            <a:r>
+              <a:rPr sz="2800" spc="-210" dirty="0">
+                <a:latin typeface="Trebuchet MS"/>
+                <a:cs typeface="Trebuchet MS"/>
+              </a:rPr>
+              <a:t> </a:t>
+            </a:r>
+            <a:r>
+              <a:rPr sz="2800" spc="-120" dirty="0">
+                <a:latin typeface="Trebuchet MS"/>
+                <a:cs typeface="Trebuchet MS"/>
+              </a:rPr>
+              <a:t>computer</a:t>
+            </a:r>
+            <a:r>
+              <a:rPr sz="2800" spc="-210" dirty="0">
+                <a:latin typeface="Trebuchet MS"/>
+                <a:cs typeface="Trebuchet MS"/>
+              </a:rPr>
+              <a:t> </a:t>
+            </a:r>
+            <a:r>
+              <a:rPr sz="2800" spc="-95" dirty="0">
+                <a:latin typeface="Trebuchet MS"/>
+                <a:cs typeface="Trebuchet MS"/>
+              </a:rPr>
+              <a:t>and</a:t>
+            </a:r>
+            <a:r>
+              <a:rPr sz="2800" spc="-200" dirty="0">
+                <a:latin typeface="Trebuchet MS"/>
+                <a:cs typeface="Trebuchet MS"/>
+              </a:rPr>
+              <a:t> </a:t>
+            </a:r>
+            <a:r>
+              <a:rPr sz="2800" spc="-114" dirty="0">
+                <a:latin typeface="Trebuchet MS"/>
+                <a:cs typeface="Trebuchet MS"/>
+              </a:rPr>
+              <a:t>sync</a:t>
+            </a:r>
+            <a:r>
+              <a:rPr sz="2800" spc="-204" dirty="0">
+                <a:latin typeface="Trebuchet MS"/>
+                <a:cs typeface="Trebuchet MS"/>
+              </a:rPr>
+              <a:t> </a:t>
+            </a:r>
+            <a:r>
+              <a:rPr sz="2800" spc="-125" dirty="0">
+                <a:latin typeface="Trebuchet MS"/>
+                <a:cs typeface="Trebuchet MS"/>
+              </a:rPr>
+              <a:t>between</a:t>
+            </a:r>
+            <a:r>
+              <a:rPr sz="2800" spc="-200" dirty="0">
+                <a:latin typeface="Trebuchet MS"/>
+                <a:cs typeface="Trebuchet MS"/>
+              </a:rPr>
+              <a:t> </a:t>
+            </a:r>
+            <a:r>
+              <a:rPr sz="2800" spc="-120" dirty="0">
+                <a:latin typeface="Trebuchet MS"/>
+                <a:cs typeface="Trebuchet MS"/>
+              </a:rPr>
+              <a:t>the</a:t>
+            </a:r>
+            <a:r>
+              <a:rPr sz="2800" spc="-215" dirty="0">
+                <a:latin typeface="Trebuchet MS"/>
+                <a:cs typeface="Trebuchet MS"/>
+              </a:rPr>
+              <a:t> </a:t>
+            </a:r>
+            <a:r>
+              <a:rPr sz="2800" spc="-105" dirty="0">
+                <a:latin typeface="Trebuchet MS"/>
+                <a:cs typeface="Trebuchet MS"/>
+              </a:rPr>
+              <a:t>two  </a:t>
+            </a:r>
+            <a:r>
+              <a:rPr sz="2800" spc="-120" dirty="0">
+                <a:latin typeface="Trebuchet MS"/>
+                <a:cs typeface="Trebuchet MS"/>
+              </a:rPr>
+              <a:t>locations</a:t>
+            </a:r>
+            <a:endParaRPr sz="2800">
+              <a:latin typeface="Trebuchet MS"/>
+              <a:cs typeface="Trebuchet MS"/>
+            </a:endParaRPr>
+          </a:p>
+          <a:p>
+            <a:pPr marL="241300" indent="-228600">
+              <a:lnSpc>
+                <a:spcPct val="100000"/>
+              </a:lnSpc>
+              <a:spcBef>
+                <a:spcPts val="585"/>
+              </a:spcBef>
+              <a:buFont typeface="Arial"/>
+              <a:buChar char="•"/>
+              <a:tabLst>
+                <a:tab pos="241300" algn="l"/>
+              </a:tabLst>
+            </a:pPr>
+            <a:r>
+              <a:rPr sz="2800" spc="-90" dirty="0">
+                <a:latin typeface="Trebuchet MS"/>
+                <a:cs typeface="Trebuchet MS"/>
+              </a:rPr>
+              <a:t>Need</a:t>
+            </a:r>
+            <a:r>
+              <a:rPr sz="2800" spc="-210" dirty="0">
+                <a:latin typeface="Trebuchet MS"/>
+                <a:cs typeface="Trebuchet MS"/>
+              </a:rPr>
+              <a:t> </a:t>
+            </a:r>
+            <a:r>
+              <a:rPr sz="2800" spc="-95" dirty="0">
+                <a:latin typeface="Trebuchet MS"/>
+                <a:cs typeface="Trebuchet MS"/>
+              </a:rPr>
+              <a:t>permission</a:t>
+            </a:r>
+            <a:r>
+              <a:rPr sz="2800" spc="-204" dirty="0">
+                <a:latin typeface="Trebuchet MS"/>
+                <a:cs typeface="Trebuchet MS"/>
+              </a:rPr>
+              <a:t> </a:t>
+            </a:r>
+            <a:r>
+              <a:rPr sz="2800" spc="-110" dirty="0">
+                <a:latin typeface="Trebuchet MS"/>
+                <a:cs typeface="Trebuchet MS"/>
+              </a:rPr>
+              <a:t>of</a:t>
+            </a:r>
+            <a:r>
+              <a:rPr sz="2800" spc="-210" dirty="0">
+                <a:latin typeface="Trebuchet MS"/>
+                <a:cs typeface="Trebuchet MS"/>
+              </a:rPr>
+              <a:t> </a:t>
+            </a:r>
+            <a:r>
+              <a:rPr sz="2800" spc="-125" dirty="0">
+                <a:latin typeface="Trebuchet MS"/>
+                <a:cs typeface="Trebuchet MS"/>
+              </a:rPr>
+              <a:t>the</a:t>
+            </a:r>
+            <a:r>
+              <a:rPr sz="2800" spc="-215" dirty="0">
+                <a:latin typeface="Trebuchet MS"/>
+                <a:cs typeface="Trebuchet MS"/>
+              </a:rPr>
+              <a:t> </a:t>
+            </a:r>
+            <a:r>
+              <a:rPr sz="2800" spc="-90" dirty="0">
+                <a:latin typeface="Trebuchet MS"/>
+                <a:cs typeface="Trebuchet MS"/>
+              </a:rPr>
+              <a:t>owner</a:t>
+            </a:r>
+            <a:r>
+              <a:rPr sz="2800" spc="-210" dirty="0">
+                <a:latin typeface="Trebuchet MS"/>
+                <a:cs typeface="Trebuchet MS"/>
+              </a:rPr>
+              <a:t> </a:t>
+            </a:r>
+            <a:r>
+              <a:rPr sz="2800" spc="-114" dirty="0">
+                <a:latin typeface="Trebuchet MS"/>
+                <a:cs typeface="Trebuchet MS"/>
+              </a:rPr>
+              <a:t>to</a:t>
+            </a:r>
+            <a:r>
+              <a:rPr sz="2800" spc="-204" dirty="0">
+                <a:latin typeface="Trebuchet MS"/>
+                <a:cs typeface="Trebuchet MS"/>
+              </a:rPr>
+              <a:t> </a:t>
+            </a:r>
+            <a:r>
+              <a:rPr sz="2800" spc="-65" dirty="0">
+                <a:latin typeface="Trebuchet MS"/>
+                <a:cs typeface="Trebuchet MS"/>
+              </a:rPr>
+              <a:t>push</a:t>
+            </a:r>
+            <a:r>
+              <a:rPr sz="2800" spc="-204" dirty="0">
+                <a:latin typeface="Trebuchet MS"/>
+                <a:cs typeface="Trebuchet MS"/>
+              </a:rPr>
+              <a:t> </a:t>
+            </a:r>
+            <a:r>
+              <a:rPr sz="2800" spc="-110" dirty="0">
+                <a:latin typeface="Trebuchet MS"/>
+                <a:cs typeface="Trebuchet MS"/>
+              </a:rPr>
+              <a:t>changes</a:t>
+            </a:r>
+            <a:endParaRPr sz="2800">
+              <a:latin typeface="Trebuchet MS"/>
+              <a:cs typeface="Trebuchet MS"/>
+            </a:endParaRPr>
+          </a:p>
+        </p:txBody>
+      </p:sp>
+      <p:sp>
+        <p:nvSpPr>
+          <p:cNvPr id="4" name="TextBox 3">
+            <a:extLst>
+              <a:ext uri="{FF2B5EF4-FFF2-40B4-BE49-F238E27FC236}">
+                <a16:creationId xmlns:a16="http://schemas.microsoft.com/office/drawing/2014/main" id="{D3303380-AD0F-4F37-C90B-2ECA1D9CE100}"/>
+              </a:ext>
+            </a:extLst>
+          </p:cNvPr>
+          <p:cNvSpPr txBox="1"/>
+          <p:nvPr/>
+        </p:nvSpPr>
+        <p:spPr>
+          <a:xfrm>
+            <a:off x="381000" y="3623687"/>
+            <a:ext cx="7185750" cy="3693319"/>
+          </a:xfrm>
+          <a:prstGeom prst="rect">
+            <a:avLst/>
+          </a:prstGeom>
+          <a:noFill/>
+        </p:spPr>
+        <p:txBody>
+          <a:bodyPr wrap="none" rtlCol="0">
+            <a:spAutoFit/>
+          </a:bodyPr>
+          <a:lstStyle/>
+          <a:p>
+            <a:r>
+              <a:rPr lang="en-US" dirty="0"/>
+              <a:t>$ git clone https://</a:t>
+            </a:r>
+            <a:r>
+              <a:rPr lang="en-US" dirty="0" err="1"/>
+              <a:t>github.com</a:t>
+            </a:r>
+            <a:r>
+              <a:rPr lang="en-US" dirty="0"/>
+              <a:t>/YOUR-USERNAME/FORKED-</a:t>
+            </a:r>
+            <a:r>
+              <a:rPr lang="en-US" dirty="0" err="1"/>
+              <a:t>REPO.git</a:t>
+            </a:r>
+            <a:endParaRPr lang="en-US" dirty="0"/>
+          </a:p>
+          <a:p>
+            <a:r>
+              <a:rPr lang="en-US" dirty="0"/>
+              <a:t>$ cd FORKED-REPO</a:t>
+            </a:r>
+          </a:p>
+          <a:p>
+            <a:endParaRPr lang="en-US" dirty="0"/>
+          </a:p>
+          <a:p>
+            <a:r>
+              <a:rPr lang="en-US" b="1" dirty="0"/>
+              <a:t>#Optional:</a:t>
+            </a:r>
+            <a:br>
+              <a:rPr lang="en-US" dirty="0"/>
+            </a:br>
+            <a:r>
+              <a:rPr lang="en-US" dirty="0"/>
+              <a:t>$ git remote add upstream https://</a:t>
+            </a:r>
+            <a:r>
+              <a:rPr lang="en-US" dirty="0" err="1"/>
+              <a:t>github.com</a:t>
+            </a:r>
+            <a:r>
+              <a:rPr lang="en-US" dirty="0"/>
+              <a:t>/ORIGINAL-OWNER/</a:t>
+            </a:r>
+            <a:r>
+              <a:rPr lang="en-US" dirty="0" err="1"/>
+              <a:t>REPO.git</a:t>
+            </a:r>
+            <a:endParaRPr lang="en-US" dirty="0"/>
+          </a:p>
+          <a:p>
+            <a:r>
+              <a:rPr lang="en-US" dirty="0"/>
+              <a:t>$ git remote -v  # verify remotes</a:t>
+            </a:r>
+          </a:p>
+          <a:p>
+            <a:endParaRPr lang="en-US" dirty="0"/>
+          </a:p>
+          <a:p>
+            <a:r>
+              <a:rPr lang="en-US" dirty="0"/>
+              <a:t>#Sync your fork with the original later</a:t>
+            </a:r>
+          </a:p>
+          <a:p>
+            <a:r>
+              <a:rPr lang="en-US" dirty="0"/>
+              <a:t>$ git fetch upstream</a:t>
+            </a:r>
+          </a:p>
+          <a:p>
+            <a:r>
+              <a:rPr lang="en-US" dirty="0"/>
+              <a:t>$ git merge upstream/main</a:t>
+            </a:r>
+          </a:p>
+          <a:p>
+            <a:endParaRPr lang="en-US" dirty="0"/>
+          </a:p>
+          <a:p>
+            <a:endParaRPr lang="en-US" dirty="0"/>
+          </a:p>
+          <a:p>
+            <a:endParaRPr lang="en-US" dirty="0"/>
+          </a:p>
+        </p:txBody>
+      </p:sp>
+      <p:sp>
+        <p:nvSpPr>
+          <p:cNvPr id="5" name="TextBox 4">
+            <a:extLst>
+              <a:ext uri="{FF2B5EF4-FFF2-40B4-BE49-F238E27FC236}">
+                <a16:creationId xmlns:a16="http://schemas.microsoft.com/office/drawing/2014/main" id="{6BD1A6AB-7E22-07B2-57C0-6E8343BE57F5}"/>
+              </a:ext>
+            </a:extLst>
+          </p:cNvPr>
+          <p:cNvSpPr txBox="1"/>
+          <p:nvPr/>
+        </p:nvSpPr>
+        <p:spPr>
+          <a:xfrm>
+            <a:off x="8693714" y="5836331"/>
+            <a:ext cx="3520579" cy="523220"/>
+          </a:xfrm>
+          <a:prstGeom prst="rect">
+            <a:avLst/>
+          </a:prstGeom>
+          <a:noFill/>
+        </p:spPr>
+        <p:txBody>
+          <a:bodyPr wrap="none" rtlCol="0">
+            <a:spAutoFit/>
+          </a:bodyPr>
+          <a:lstStyle/>
+          <a:p>
+            <a:r>
+              <a:rPr lang="en-US" sz="1400" dirty="0"/>
+              <a:t>This lets you pull in updates from the original</a:t>
+            </a:r>
+          </a:p>
+          <a:p>
+            <a:endParaRPr lang="en-US" sz="1400" dirty="0"/>
           </a:p>
         </p:txBody>
       </p:sp>
@@ -22561,6 +23076,87 @@
           <a:chExt cx="0" cy="0"/>
         </a:xfrm>
       </p:grpSpPr>
+      <p:sp>
+        <p:nvSpPr>
+          <p:cNvPr id="2" name="object 2"/>
+          <p:cNvSpPr txBox="1">
+            <a:spLocks noGrp="1"/>
+          </p:cNvSpPr>
+          <p:nvPr>
+            <p:ph type="title"/>
+          </p:nvPr>
+        </p:nvSpPr>
+        <p:spPr>
+          <a:xfrm>
+            <a:off x="916939" y="611124"/>
+            <a:ext cx="3000375" cy="695960"/>
+          </a:xfrm>
+          <a:prstGeom prst="rect">
+            <a:avLst/>
+          </a:prstGeom>
+        </p:spPr>
+        <p:txBody>
+          <a:bodyPr vert="horz" wrap="square" lIns="0" tIns="12700" rIns="0" bIns="0" rtlCol="0">
+            <a:spAutoFit/>
+          </a:bodyPr>
+          <a:lstStyle/>
+          <a:p>
+            <a:pPr marL="12700">
+              <a:lnSpc>
+                <a:spcPct val="100000"/>
+              </a:lnSpc>
+              <a:spcBef>
+                <a:spcPts val="100"/>
+              </a:spcBef>
+            </a:pPr>
+            <a:r>
+              <a:rPr spc="-225" dirty="0"/>
+              <a:t>Fork </a:t>
+            </a:r>
+            <a:r>
+              <a:rPr spc="-160" dirty="0"/>
+              <a:t>vs</a:t>
+            </a:r>
+            <a:r>
+              <a:rPr spc="-509" dirty="0"/>
+              <a:t> </a:t>
+            </a:r>
+            <a:r>
+              <a:rPr spc="-204" dirty="0"/>
+              <a:t>Clone</a:t>
+            </a:r>
+          </a:p>
+        </p:txBody>
+      </p:sp>
+      <p:sp>
+        <p:nvSpPr>
+          <p:cNvPr id="3" name="object 3"/>
+          <p:cNvSpPr/>
+          <p:nvPr/>
+        </p:nvSpPr>
+        <p:spPr>
+          <a:xfrm>
+            <a:off x="4125429" y="365127"/>
+            <a:ext cx="5800801" cy="6285953"/>
+          </a:xfrm>
+          <a:prstGeom prst="rect">
+            <a:avLst/>
+          </a:prstGeom>
+          <a:blipFill>
+            <a:blip r:embed="rId2" cstate="print"/>
+            <a:stretch>
+              <a:fillRect/>
+            </a:stretch>
+          </a:blipFill>
+        </p:spPr>
+        <p:txBody>
+          <a:bodyPr wrap="square" lIns="0" tIns="0" rIns="0" bIns="0" rtlCol="0"/>
+          <a:lstStyle/>
+          <a:p>
+            <a:endParaRPr/>
+          </a:p>
+        </p:txBody>
+      </p:sp>
     </p:spTree>
   </p:cSld>
   <p:clrMapOvr>
@@ -22570,6 +23166,31 @@
 </file>
 
 <file path=ppt/slides/slide52.xml><?xml version="1.0" encoding="utf-8"?>
+<p:sld xmlns:a="http://schemas.openxmlformats.org/drawingml/2006/main" xmlns:r="http://schemas.openxmlformats.org/officeDocument/2006/relationships" xmlns:p="http://schemas.openxmlformats.org/presentationml/2006/main">
+  <p:cSld>
+    <p:spTree>
+      <p:nvGrpSpPr>
+        <p:cNvPr id="1" name=""/>
+        <p:cNvGrpSpPr/>
+        <p:nvPr/>
+      </p:nvGrpSpPr>
+      <p:grpSpPr>
+        <a:xfrm>
+          <a:off x="0" y="0"/>
+          <a:ext cx="0" cy="0"/>
+          <a:chOff x="0" y="0"/>
+          <a:chExt cx="0" cy="0"/>
+        </a:xfrm>
+      </p:grpSpPr>
+    </p:spTree>
+  </p:cSld>
+  <p:clrMapOvr>
+    <a:masterClrMapping/>
+  </p:clrMapOvr>
+</p:sld>
+</file>
+
+<file path=ppt/slides/slide53.xml><?xml version="1.0" encoding="utf-8"?>
 <p:sld xmlns:a="http://schemas.openxmlformats.org/drawingml/2006/main" xmlns:r="http://schemas.openxmlformats.org/officeDocument/2006/relationships" xmlns:p="http://schemas.openxmlformats.org/presentationml/2006/main">
   <p:cSld>
     <p:spTree>
@@ -22837,7 +23458,7 @@
 </p:sld>
 </file>
 
-<file path=ppt/slides/slide53.xml><?xml version="1.0" encoding="utf-8"?>
+<file path=ppt/slides/slide54.xml><?xml version="1.0" encoding="utf-8"?>
 <p:sld xmlns:a="http://schemas.openxmlformats.org/drawingml/2006/main" xmlns:r="http://schemas.openxmlformats.org/officeDocument/2006/relationships" xmlns:p="http://schemas.openxmlformats.org/presentationml/2006/main">
   <p:cSld>
     <p:spTree>
@@ -23807,6 +24428,46 @@
           </a:fontRef>
         </p:style>
       </p:cxnSp>
+      <p:sp>
+        <p:nvSpPr>
+          <p:cNvPr id="4" name="TextBox 3">
+            <a:extLst>
+              <a:ext uri="{FF2B5EF4-FFF2-40B4-BE49-F238E27FC236}">
+                <a16:creationId xmlns:a16="http://schemas.microsoft.com/office/drawing/2014/main" id="{766B0505-FF3C-83D9-86A9-2AE85A0CBFE3}"/>
+              </a:ext>
+            </a:extLst>
+          </p:cNvPr>
+          <p:cNvSpPr txBox="1"/>
+          <p:nvPr/>
+        </p:nvSpPr>
+        <p:spPr>
+          <a:xfrm>
+            <a:off x="4096315" y="6246876"/>
+            <a:ext cx="3999368" cy="646331"/>
+          </a:xfrm>
+          <a:prstGeom prst="rect">
+            <a:avLst/>
+          </a:prstGeom>
+          <a:noFill/>
+        </p:spPr>
+        <p:txBody>
+          <a:bodyPr wrap="square" rtlCol="0">
+            <a:spAutoFit/>
+          </a:bodyPr>
+          <a:lstStyle/>
+          <a:p>
+            <a:r>
+              <a:rPr lang="en-US" dirty="0"/>
+              <a:t>*Don’t need create-mod date if using </a:t>
+            </a:r>
+            <a:r>
+              <a:rPr lang="en-US" dirty="0" err="1"/>
+              <a:t>github</a:t>
+            </a:r>
+            <a:endParaRPr lang="en-US" dirty="0"/>
+          </a:p>
+        </p:txBody>
+      </p:sp>
     </p:spTree>
     <p:extLst>
       <p:ext uri="{BB962C8B-B14F-4D97-AF65-F5344CB8AC3E}">

</xml_diff>